<commit_message>
Revision 12 2nd round of revisions forgot to commit revision 11
</commit_message>
<xml_diff>
--- a/images_source/bcompare.pptx
+++ b/images_source/bcompare.pptx
@@ -192,7 +192,7 @@
           <a:p>
             <a:fld id="{B9451441-5AC3-4425-ADB4-AF00AF0D06F4}" type="datetimeFigureOut">
               <a:rPr lang="en-US" smtClean="0"/>
-              <a:t>7/22/2013</a:t>
+              <a:t>12/5/2013</a:t>
             </a:fld>
             <a:endParaRPr lang="en-US"/>
           </a:p>
@@ -725,7 +725,7 @@
           <a:p>
             <a:fld id="{162E17F1-229C-4A3D-85F2-7F40D9986B5A}" type="datetimeFigureOut">
               <a:rPr lang="en-US" smtClean="0"/>
-              <a:t>7/22/2013</a:t>
+              <a:t>12/5/2013</a:t>
             </a:fld>
             <a:endParaRPr lang="en-US"/>
           </a:p>
@@ -895,7 +895,7 @@
           <a:p>
             <a:fld id="{162E17F1-229C-4A3D-85F2-7F40D9986B5A}" type="datetimeFigureOut">
               <a:rPr lang="en-US" smtClean="0"/>
-              <a:t>7/22/2013</a:t>
+              <a:t>12/5/2013</a:t>
             </a:fld>
             <a:endParaRPr lang="en-US"/>
           </a:p>
@@ -1075,7 +1075,7 @@
           <a:p>
             <a:fld id="{162E17F1-229C-4A3D-85F2-7F40D9986B5A}" type="datetimeFigureOut">
               <a:rPr lang="en-US" smtClean="0"/>
-              <a:t>7/22/2013</a:t>
+              <a:t>12/5/2013</a:t>
             </a:fld>
             <a:endParaRPr lang="en-US"/>
           </a:p>
@@ -1245,7 +1245,7 @@
           <a:p>
             <a:fld id="{162E17F1-229C-4A3D-85F2-7F40D9986B5A}" type="datetimeFigureOut">
               <a:rPr lang="en-US" smtClean="0"/>
-              <a:t>7/22/2013</a:t>
+              <a:t>12/5/2013</a:t>
             </a:fld>
             <a:endParaRPr lang="en-US"/>
           </a:p>
@@ -1491,7 +1491,7 @@
           <a:p>
             <a:fld id="{162E17F1-229C-4A3D-85F2-7F40D9986B5A}" type="datetimeFigureOut">
               <a:rPr lang="en-US" smtClean="0"/>
-              <a:t>7/22/2013</a:t>
+              <a:t>12/5/2013</a:t>
             </a:fld>
             <a:endParaRPr lang="en-US"/>
           </a:p>
@@ -1779,7 +1779,7 @@
           <a:p>
             <a:fld id="{162E17F1-229C-4A3D-85F2-7F40D9986B5A}" type="datetimeFigureOut">
               <a:rPr lang="en-US" smtClean="0"/>
-              <a:t>7/22/2013</a:t>
+              <a:t>12/5/2013</a:t>
             </a:fld>
             <a:endParaRPr lang="en-US"/>
           </a:p>
@@ -2201,7 +2201,7 @@
           <a:p>
             <a:fld id="{162E17F1-229C-4A3D-85F2-7F40D9986B5A}" type="datetimeFigureOut">
               <a:rPr lang="en-US" smtClean="0"/>
-              <a:t>7/22/2013</a:t>
+              <a:t>12/5/2013</a:t>
             </a:fld>
             <a:endParaRPr lang="en-US"/>
           </a:p>
@@ -2319,7 +2319,7 @@
           <a:p>
             <a:fld id="{162E17F1-229C-4A3D-85F2-7F40D9986B5A}" type="datetimeFigureOut">
               <a:rPr lang="en-US" smtClean="0"/>
-              <a:t>7/22/2013</a:t>
+              <a:t>12/5/2013</a:t>
             </a:fld>
             <a:endParaRPr lang="en-US"/>
           </a:p>
@@ -2414,7 +2414,7 @@
           <a:p>
             <a:fld id="{162E17F1-229C-4A3D-85F2-7F40D9986B5A}" type="datetimeFigureOut">
               <a:rPr lang="en-US" smtClean="0"/>
-              <a:t>7/22/2013</a:t>
+              <a:t>12/5/2013</a:t>
             </a:fld>
             <a:endParaRPr lang="en-US"/>
           </a:p>
@@ -2691,7 +2691,7 @@
           <a:p>
             <a:fld id="{162E17F1-229C-4A3D-85F2-7F40D9986B5A}" type="datetimeFigureOut">
               <a:rPr lang="en-US" smtClean="0"/>
-              <a:t>7/22/2013</a:t>
+              <a:t>12/5/2013</a:t>
             </a:fld>
             <a:endParaRPr lang="en-US"/>
           </a:p>
@@ -2944,7 +2944,7 @@
           <a:p>
             <a:fld id="{162E17F1-229C-4A3D-85F2-7F40D9986B5A}" type="datetimeFigureOut">
               <a:rPr lang="en-US" smtClean="0"/>
-              <a:t>7/22/2013</a:t>
+              <a:t>12/5/2013</a:t>
             </a:fld>
             <a:endParaRPr lang="en-US"/>
           </a:p>
@@ -3157,7 +3157,7 @@
           <a:p>
             <a:fld id="{162E17F1-229C-4A3D-85F2-7F40D9986B5A}" type="datetimeFigureOut">
               <a:rPr lang="en-US" smtClean="0"/>
-              <a:t>7/22/2013</a:t>
+              <a:t>12/5/2013</a:t>
             </a:fld>
             <a:endParaRPr lang="en-US"/>
           </a:p>
@@ -3534,13 +3534,13 @@
       </p:grpSpPr>
       <p:pic>
         <p:nvPicPr>
-          <p:cNvPr id="1029" name="Picture 5" descr="C:\Users\Owner\Dropbox\Git\MagnetoPhonons\images\split.png"/>
+          <p:cNvPr id="2" name="Picture 2" descr="C:\Users\Owner\Dropbox\Git\MagnetoPhonons\images_source\GateVoltageTuning-FitData.png"/>
           <p:cNvPicPr>
-            <a:picLocks noChangeAspect="1" noChangeArrowheads="1"/>
+            <a:picLocks noChangeArrowheads="1"/>
           </p:cNvPicPr>
           <p:nvPr/>
         </p:nvPicPr>
-        <p:blipFill rotWithShape="1">
+        <p:blipFill>
           <a:blip r:embed="rId3" cstate="print">
             <a:extLst>
               <a:ext uri="{28A0092B-C50C-407E-A947-70E740481C1C}">
@@ -3548,13 +3548,15 @@
               </a:ext>
             </a:extLst>
           </a:blip>
-          <a:srcRect l="26512"/>
-          <a:stretch/>
+          <a:srcRect/>
+          <a:stretch>
+            <a:fillRect/>
+          </a:stretch>
         </p:blipFill>
         <p:spPr bwMode="auto">
           <a:xfrm>
-            <a:off x="2433002" y="396874"/>
-            <a:ext cx="1956435" cy="1554163"/>
+            <a:off x="1709928" y="1847088"/>
+            <a:ext cx="2660650" cy="1572768"/>
           </a:xfrm>
           <a:prstGeom prst="rect">
             <a:avLst/>
@@ -3573,7 +3575,7 @@
       </p:pic>
       <p:pic>
         <p:nvPicPr>
-          <p:cNvPr id="1028" name="Picture 4" descr="C:\Users\Owner\Dropbox\Git\MagnetoPhonons\images\greyscale.png"/>
+          <p:cNvPr id="1029" name="Picture 5" descr="C:\Users\Owner\Dropbox\Git\MagnetoPhonons\images\split.png"/>
           <p:cNvPicPr>
             <a:picLocks noChangeAspect="1" noChangeArrowheads="1"/>
           </p:cNvPicPr>
@@ -3587,13 +3589,13 @@
               </a:ext>
             </a:extLst>
           </a:blip>
-          <a:srcRect r="5665"/>
+          <a:srcRect l="26512"/>
           <a:stretch/>
         </p:blipFill>
         <p:spPr bwMode="auto">
           <a:xfrm>
-            <a:off x="-103629" y="396874"/>
-            <a:ext cx="2511425" cy="1554163"/>
+            <a:off x="2433002" y="396874"/>
+            <a:ext cx="1956435" cy="1554163"/>
           </a:xfrm>
           <a:prstGeom prst="rect">
             <a:avLst/>
@@ -3612,7 +3614,7 @@
       </p:pic>
       <p:pic>
         <p:nvPicPr>
-          <p:cNvPr id="1027" name="Picture 3" descr="C:\Users\Owner\Dropbox\Git\MagnetoPhonons\images\GateVoltageTuning-FitData.png"/>
+          <p:cNvPr id="1028" name="Picture 4" descr="C:\Users\Owner\Dropbox\Git\MagnetoPhonons\images\greyscale.png"/>
           <p:cNvPicPr>
             <a:picLocks noChangeAspect="1" noChangeArrowheads="1"/>
           </p:cNvPicPr>
@@ -3626,13 +3628,13 @@
               </a:ext>
             </a:extLst>
           </a:blip>
-          <a:srcRect l="27685"/>
+          <a:srcRect r="5665"/>
           <a:stretch/>
         </p:blipFill>
         <p:spPr bwMode="auto">
           <a:xfrm>
-            <a:off x="2450592" y="1844673"/>
-            <a:ext cx="1924442" cy="1554480"/>
+            <a:off x="-103629" y="396874"/>
+            <a:ext cx="2511425" cy="1554163"/>
           </a:xfrm>
           <a:prstGeom prst="rect">
             <a:avLst/>

</xml_diff>